<commit_message>
Twenty-six - Commit BE
User profile can edit
</commit_message>
<xml_diff>
--- a/target/TechZone-1.0-SNAPSHOT/asset/descriptionfor web/TechZone.pptx
+++ b/target/TechZone-1.0-SNAPSHOT/asset/descriptionfor web/TechZone.pptx
@@ -16,12 +16,14 @@
     <p:sldId id="263" r:id="rId10"/>
     <p:sldId id="265" r:id="rId11"/>
     <p:sldId id="267" r:id="rId12"/>
-    <p:sldId id="268" r:id="rId13"/>
-    <p:sldId id="269" r:id="rId14"/>
-    <p:sldId id="270" r:id="rId15"/>
-    <p:sldId id="272" r:id="rId16"/>
-    <p:sldId id="264" r:id="rId17"/>
-    <p:sldId id="266" r:id="rId18"/>
+    <p:sldId id="275" r:id="rId13"/>
+    <p:sldId id="268" r:id="rId14"/>
+    <p:sldId id="269" r:id="rId15"/>
+    <p:sldId id="274" r:id="rId16"/>
+    <p:sldId id="270" r:id="rId17"/>
+    <p:sldId id="272" r:id="rId18"/>
+    <p:sldId id="264" r:id="rId19"/>
+    <p:sldId id="266" r:id="rId20"/>
   </p:sldIdLst>
   <p:sldSz cx="12192000" cy="6858000"/>
   <p:notesSz cx="6858000" cy="9144000"/>
@@ -2781,10 +2783,10 @@
       </p:grpSpPr>
       <p:sp>
         <p:nvSpPr>
-          <p:cNvPr id="7" name="9Slide.vn - 2019">
-            <a:extLst>
-              <a:ext uri="{FF2B5EF4-FFF2-40B4-BE49-F238E27FC236}">
-                <a16:creationId xmlns:a16="http://schemas.microsoft.com/office/drawing/2014/main" id="{A4D6F4D8-ABDA-0A52-392F-0B6706ACB795}"/>
+          <p:cNvPr id="11" name="9Slide.vn - 2019">
+            <a:extLst>
+              <a:ext uri="{FF2B5EF4-FFF2-40B4-BE49-F238E27FC236}">
+                <a16:creationId xmlns:a16="http://schemas.microsoft.com/office/drawing/2014/main" id="{7C448EB3-E52A-5767-EEA6-6BFF1E8A813E}"/>
               </a:ext>
             </a:extLst>
           </p:cNvPr>
@@ -3964,6 +3966,124 @@
       </p:sp>
       <p:pic>
         <p:nvPicPr>
+          <p:cNvPr id="2" name="Picture 1">
+            <a:extLst>
+              <a:ext uri="{FF2B5EF4-FFF2-40B4-BE49-F238E27FC236}">
+                <a16:creationId xmlns:a16="http://schemas.microsoft.com/office/drawing/2014/main" id="{95D4009D-8416-B584-2271-18DA7D580339}"/>
+              </a:ext>
+            </a:extLst>
+          </p:cNvPr>
+          <p:cNvPicPr>
+            <a:picLocks noChangeAspect="1"/>
+          </p:cNvPicPr>
+          <p:nvPr/>
+        </p:nvPicPr>
+        <p:blipFill>
+          <a:blip r:embed="rId2"/>
+          <a:srcRect t="12000" b="12000"/>
+          <a:stretch/>
+        </p:blipFill>
+        <p:spPr>
+          <a:xfrm>
+            <a:off x="4038600" y="1849477"/>
+            <a:ext cx="3218212" cy="3260013"/>
+          </a:xfrm>
+          <a:prstGeom prst="rect">
+            <a:avLst/>
+          </a:prstGeom>
+        </p:spPr>
+      </p:pic>
+    </p:spTree>
+    <p:extLst>
+      <p:ext uri="{BB962C8B-B14F-4D97-AF65-F5344CB8AC3E}">
+        <p14:creationId xmlns:p14="http://schemas.microsoft.com/office/powerpoint/2010/main" val="2775950881"/>
+      </p:ext>
+    </p:extLst>
+  </p:cSld>
+  <p:clrMapOvr>
+    <a:masterClrMapping/>
+  </p:clrMapOvr>
+  <p:transition>
+    <p:fade/>
+  </p:transition>
+</p:sld>
+</file>
+
+<file path=ppt/slides/slide13.xml><?xml version="1.0" encoding="utf-8"?>
+<p:sld xmlns:a="http://schemas.openxmlformats.org/drawingml/2006/main" xmlns:r="http://schemas.openxmlformats.org/officeDocument/2006/relationships" xmlns:p="http://schemas.openxmlformats.org/presentationml/2006/main">
+  <p:cSld>
+    <p:bg>
+      <p:bgPr>
+        <a:solidFill>
+          <a:srgbClr val="FFFFFF"/>
+        </a:solidFill>
+        <a:effectLst/>
+      </p:bgPr>
+    </p:bg>
+    <p:spTree>
+      <p:nvGrpSpPr>
+        <p:cNvPr id="1" name=""/>
+        <p:cNvGrpSpPr/>
+        <p:nvPr/>
+      </p:nvGrpSpPr>
+      <p:grpSpPr>
+        <a:xfrm>
+          <a:off x="0" y="0"/>
+          <a:ext cx="0" cy="0"/>
+          <a:chOff x="0" y="0"/>
+          <a:chExt cx="0" cy="0"/>
+        </a:xfrm>
+      </p:grpSpPr>
+      <p:sp>
+        <p:nvSpPr>
+          <p:cNvPr id="5" name="Rectangle 4">
+            <a:extLst>
+              <a:ext uri="{FF2B5EF4-FFF2-40B4-BE49-F238E27FC236}">
+                <a16:creationId xmlns:a16="http://schemas.microsoft.com/office/drawing/2014/main" id="{ADFF3A91-4295-9C52-3061-E78CAA08800E}"/>
+              </a:ext>
+            </a:extLst>
+          </p:cNvPr>
+          <p:cNvSpPr/>
+          <p:nvPr/>
+        </p:nvSpPr>
+        <p:spPr>
+          <a:xfrm>
+            <a:off x="2590800" y="1167769"/>
+            <a:ext cx="6377306" cy="4623431"/>
+          </a:xfrm>
+          <a:prstGeom prst="rect">
+            <a:avLst/>
+          </a:prstGeom>
+          <a:noFill/>
+          <a:ln w="57150"/>
+        </p:spPr>
+        <p:style>
+          <a:lnRef idx="2">
+            <a:schemeClr val="accent1">
+              <a:shade val="15000"/>
+            </a:schemeClr>
+          </a:lnRef>
+          <a:fillRef idx="1">
+            <a:schemeClr val="accent1"/>
+          </a:fillRef>
+          <a:effectRef idx="0">
+            <a:schemeClr val="accent1"/>
+          </a:effectRef>
+          <a:fontRef idx="minor">
+            <a:schemeClr val="lt1"/>
+          </a:fontRef>
+        </p:style>
+        <p:txBody>
+          <a:bodyPr rtlCol="0" anchor="ctr"/>
+          <a:lstStyle/>
+          <a:p>
+            <a:pPr algn="ctr"/>
+            <a:endParaRPr lang="en-US"/>
+          </a:p>
+        </p:txBody>
+      </p:sp>
+      <p:pic>
+        <p:nvPicPr>
           <p:cNvPr id="2" name="Picture 2">
             <a:extLst>
               <a:ext uri="{FF2B5EF4-FFF2-40B4-BE49-F238E27FC236}">
@@ -4025,7 +4145,7 @@
 </p:sld>
 </file>
 
-<file path=ppt/slides/slide13.xml><?xml version="1.0" encoding="utf-8"?>
+<file path=ppt/slides/slide14.xml><?xml version="1.0" encoding="utf-8"?>
 <p:sld xmlns:a="http://schemas.openxmlformats.org/drawingml/2006/main" xmlns:r="http://schemas.openxmlformats.org/officeDocument/2006/relationships" xmlns:p="http://schemas.openxmlformats.org/presentationml/2006/main">
   <p:cSld>
     <p:bg>
@@ -4159,7 +4279,143 @@
 </p:sld>
 </file>
 
-<file path=ppt/slides/slide14.xml><?xml version="1.0" encoding="utf-8"?>
+<file path=ppt/slides/slide15.xml><?xml version="1.0" encoding="utf-8"?>
+<p:sld xmlns:a="http://schemas.openxmlformats.org/drawingml/2006/main" xmlns:r="http://schemas.openxmlformats.org/officeDocument/2006/relationships" xmlns:p="http://schemas.openxmlformats.org/presentationml/2006/main">
+  <p:cSld>
+    <p:bg>
+      <p:bgPr>
+        <a:solidFill>
+          <a:srgbClr val="F7F7F7"/>
+        </a:solidFill>
+        <a:effectLst/>
+      </p:bgPr>
+    </p:bg>
+    <p:spTree>
+      <p:nvGrpSpPr>
+        <p:cNvPr id="1" name=""/>
+        <p:cNvGrpSpPr/>
+        <p:nvPr/>
+      </p:nvGrpSpPr>
+      <p:grpSpPr>
+        <a:xfrm>
+          <a:off x="0" y="0"/>
+          <a:ext cx="0" cy="0"/>
+          <a:chOff x="0" y="0"/>
+          <a:chExt cx="0" cy="0"/>
+        </a:xfrm>
+      </p:grpSpPr>
+      <p:sp>
+        <p:nvSpPr>
+          <p:cNvPr id="5" name="Rectangle 4">
+            <a:extLst>
+              <a:ext uri="{FF2B5EF4-FFF2-40B4-BE49-F238E27FC236}">
+                <a16:creationId xmlns:a16="http://schemas.microsoft.com/office/drawing/2014/main" id="{ADFF3A91-4295-9C52-3061-E78CAA08800E}"/>
+              </a:ext>
+            </a:extLst>
+          </p:cNvPr>
+          <p:cNvSpPr/>
+          <p:nvPr/>
+        </p:nvSpPr>
+        <p:spPr>
+          <a:xfrm>
+            <a:off x="2590800" y="1167769"/>
+            <a:ext cx="6377306" cy="4623431"/>
+          </a:xfrm>
+          <a:prstGeom prst="rect">
+            <a:avLst/>
+          </a:prstGeom>
+          <a:noFill/>
+          <a:ln w="57150"/>
+        </p:spPr>
+        <p:style>
+          <a:lnRef idx="2">
+            <a:schemeClr val="accent1">
+              <a:shade val="15000"/>
+            </a:schemeClr>
+          </a:lnRef>
+          <a:fillRef idx="1">
+            <a:schemeClr val="accent1"/>
+          </a:fillRef>
+          <a:effectRef idx="0">
+            <a:schemeClr val="accent1"/>
+          </a:effectRef>
+          <a:fontRef idx="minor">
+            <a:schemeClr val="lt1"/>
+          </a:fontRef>
+        </p:style>
+        <p:txBody>
+          <a:bodyPr rtlCol="0" anchor="ctr"/>
+          <a:lstStyle/>
+          <a:p>
+            <a:pPr algn="ctr"/>
+            <a:endParaRPr lang="en-US"/>
+          </a:p>
+        </p:txBody>
+      </p:sp>
+      <p:pic>
+        <p:nvPicPr>
+          <p:cNvPr id="1028" name="Picture 4">
+            <a:extLst>
+              <a:ext uri="{FF2B5EF4-FFF2-40B4-BE49-F238E27FC236}">
+                <a16:creationId xmlns:a16="http://schemas.microsoft.com/office/drawing/2014/main" id="{039425E3-36BB-C2CB-B3A4-1CC7A72C6022}"/>
+              </a:ext>
+            </a:extLst>
+          </p:cNvPr>
+          <p:cNvPicPr>
+            <a:picLocks noChangeAspect="1" noChangeArrowheads="1"/>
+          </p:cNvPicPr>
+          <p:nvPr/>
+        </p:nvPicPr>
+        <p:blipFill>
+          <a:blip r:embed="rId2">
+            <a:extLst>
+              <a:ext uri="{28A0092B-C50C-407E-A947-70E740481C1C}">
+                <a14:useLocalDpi xmlns:a14="http://schemas.microsoft.com/office/drawing/2010/main" val="0"/>
+              </a:ext>
+            </a:extLst>
+          </a:blip>
+          <a:srcRect/>
+          <a:stretch>
+            <a:fillRect/>
+          </a:stretch>
+        </p:blipFill>
+        <p:spPr bwMode="auto">
+          <a:xfrm>
+            <a:off x="3369627" y="1803320"/>
+            <a:ext cx="4707573" cy="3530680"/>
+          </a:xfrm>
+          <a:prstGeom prst="rect">
+            <a:avLst/>
+          </a:prstGeom>
+          <a:noFill/>
+          <a:extLst>
+            <a:ext uri="{909E8E84-426E-40DD-AFC4-6F175D3DCCD1}">
+              <a14:hiddenFill xmlns:a14="http://schemas.microsoft.com/office/drawing/2010/main">
+                <a:solidFill>
+                  <a:srgbClr val="FFFFFF"/>
+                </a:solidFill>
+              </a14:hiddenFill>
+            </a:ext>
+          </a:extLst>
+        </p:spPr>
+      </p:pic>
+    </p:spTree>
+    <p:extLst>
+      <p:ext uri="{BB962C8B-B14F-4D97-AF65-F5344CB8AC3E}">
+        <p14:creationId xmlns:p14="http://schemas.microsoft.com/office/powerpoint/2010/main" val="2524836890"/>
+      </p:ext>
+    </p:extLst>
+  </p:cSld>
+  <p:clrMapOvr>
+    <a:masterClrMapping/>
+  </p:clrMapOvr>
+  <p:transition>
+    <p:fade/>
+  </p:transition>
+</p:sld>
+</file>
+
+<file path=ppt/slides/slide16.xml><?xml version="1.0" encoding="utf-8"?>
 <p:sld xmlns:a="http://schemas.openxmlformats.org/drawingml/2006/main" xmlns:r="http://schemas.openxmlformats.org/officeDocument/2006/relationships" xmlns:p="http://schemas.openxmlformats.org/presentationml/2006/main">
   <p:cSld>
     <p:bg>
@@ -4295,7 +4551,7 @@
 </p:sld>
 </file>
 
-<file path=ppt/slides/slide15.xml><?xml version="1.0" encoding="utf-8"?>
+<file path=ppt/slides/slide17.xml><?xml version="1.0" encoding="utf-8"?>
 <p:sld xmlns:a="http://schemas.openxmlformats.org/drawingml/2006/main" xmlns:r="http://schemas.openxmlformats.org/officeDocument/2006/relationships" xmlns:p="http://schemas.openxmlformats.org/presentationml/2006/main">
   <p:cSld>
     <p:bg>
@@ -4431,7 +4687,7 @@
 </p:sld>
 </file>
 
-<file path=ppt/slides/slide16.xml><?xml version="1.0" encoding="utf-8"?>
+<file path=ppt/slides/slide18.xml><?xml version="1.0" encoding="utf-8"?>
 <p:sld xmlns:a="http://schemas.openxmlformats.org/drawingml/2006/main" xmlns:r="http://schemas.openxmlformats.org/officeDocument/2006/relationships" xmlns:p="http://schemas.openxmlformats.org/presentationml/2006/main">
   <p:cSld>
     <p:bg>
@@ -4760,7 +5016,7 @@
 </p:sld>
 </file>
 
-<file path=ppt/slides/slide17.xml><?xml version="1.0" encoding="utf-8"?>
+<file path=ppt/slides/slide19.xml><?xml version="1.0" encoding="utf-8"?>
 <p:sld xmlns:a="http://schemas.openxmlformats.org/drawingml/2006/main" xmlns:r="http://schemas.openxmlformats.org/officeDocument/2006/relationships" xmlns:p="http://schemas.openxmlformats.org/presentationml/2006/main">
   <p:cSld>
     <p:bg>

</xml_diff>